<commit_message>
updated documentations 4 eng, mob & csp
</commit_message>
<xml_diff>
--- a/____General information/RevenueWorkfor26102018/Revenue Presentation.pptx
+++ b/____General information/RevenueWorkfor26102018/Revenue Presentation.pptx
@@ -168,10 +168,6 @@
     </p:ext>
   </p:extLst>
 </p:presentation>
-</file>
-
-<file path=ppt/revisionInfo.xml><?xml version="1.0" encoding="utf-8"?>
-<p1510:revInfo xmlns:a="http://schemas.openxmlformats.org/drawingml/2006/main" xmlns:r="http://schemas.openxmlformats.org/officeDocument/2006/relationships" xmlns:p1510="http://schemas.microsoft.com/office/powerpoint/2015/10/main"/>
 </file>
 
 <file path=ppt/slideLayouts/slideLayout1.xml><?xml version="1.0" encoding="utf-8"?>
@@ -371,7 +367,7 @@
               <a:pPr>
                 <a:defRPr/>
               </a:pPr>
-              <a:t>26/09/2018</a:t>
+              <a:t>23/10/2018</a:t>
             </a:fld>
             <a:endParaRPr lang="en-IE"/>
           </a:p>
@@ -586,7 +582,7 @@
               <a:pPr>
                 <a:defRPr/>
               </a:pPr>
-              <a:t>26/09/2018</a:t>
+              <a:t>23/10/2018</a:t>
             </a:fld>
             <a:endParaRPr lang="en-IE"/>
           </a:p>
@@ -811,7 +807,7 @@
               <a:pPr>
                 <a:defRPr/>
               </a:pPr>
-              <a:t>26/09/2018</a:t>
+              <a:t>23/10/2018</a:t>
             </a:fld>
             <a:endParaRPr lang="en-IE"/>
           </a:p>
@@ -1098,7 +1094,7 @@
               <a:pPr>
                 <a:defRPr/>
               </a:pPr>
-              <a:t>26/09/2018</a:t>
+              <a:t>23/10/2018</a:t>
             </a:fld>
             <a:endParaRPr lang="en-IE"/>
           </a:p>
@@ -1313,7 +1309,7 @@
               <a:pPr>
                 <a:defRPr/>
               </a:pPr>
-              <a:t>26/09/2018</a:t>
+              <a:t>23/10/2018</a:t>
             </a:fld>
             <a:endParaRPr lang="en-IE"/>
           </a:p>
@@ -1604,7 +1600,7 @@
               <a:pPr>
                 <a:defRPr/>
               </a:pPr>
-              <a:t>26/09/2018</a:t>
+              <a:t>23/10/2018</a:t>
             </a:fld>
             <a:endParaRPr lang="en-IE"/>
           </a:p>
@@ -1937,7 +1933,7 @@
               <a:pPr>
                 <a:defRPr/>
               </a:pPr>
-              <a:t>26/09/2018</a:t>
+              <a:t>23/10/2018</a:t>
             </a:fld>
             <a:endParaRPr lang="en-IE"/>
           </a:p>
@@ -2404,7 +2400,7 @@
               <a:pPr>
                 <a:defRPr/>
               </a:pPr>
-              <a:t>26/09/2018</a:t>
+              <a:t>23/10/2018</a:t>
             </a:fld>
             <a:endParaRPr lang="en-IE"/>
           </a:p>
@@ -2567,7 +2563,7 @@
               <a:pPr>
                 <a:defRPr/>
               </a:pPr>
-              <a:t>26/09/2018</a:t>
+              <a:t>23/10/2018</a:t>
             </a:fld>
             <a:endParaRPr lang="en-IE"/>
           </a:p>
@@ -2707,7 +2703,7 @@
               <a:pPr>
                 <a:defRPr/>
               </a:pPr>
-              <a:t>26/09/2018</a:t>
+              <a:t>23/10/2018</a:t>
             </a:fld>
             <a:endParaRPr lang="en-IE"/>
           </a:p>
@@ -3029,7 +3025,7 @@
               <a:pPr>
                 <a:defRPr/>
               </a:pPr>
-              <a:t>26/09/2018</a:t>
+              <a:t>23/10/2018</a:t>
             </a:fld>
             <a:endParaRPr lang="en-IE"/>
           </a:p>
@@ -3244,7 +3240,7 @@
               <a:pPr>
                 <a:defRPr/>
               </a:pPr>
-              <a:t>26/09/2018</a:t>
+              <a:t>23/10/2018</a:t>
             </a:fld>
             <a:endParaRPr lang="en-IE"/>
           </a:p>
@@ -3545,7 +3541,7 @@
               <a:pPr>
                 <a:defRPr/>
               </a:pPr>
-              <a:t>26/09/2018</a:t>
+              <a:t>23/10/2018</a:t>
             </a:fld>
             <a:endParaRPr lang="en-IE"/>
           </a:p>
@@ -3760,7 +3756,7 @@
               <a:pPr>
                 <a:defRPr/>
               </a:pPr>
-              <a:t>26/09/2018</a:t>
+              <a:t>23/10/2018</a:t>
             </a:fld>
             <a:endParaRPr lang="en-IE"/>
           </a:p>
@@ -3985,7 +3981,7 @@
               <a:pPr>
                 <a:defRPr/>
               </a:pPr>
-              <a:t>26/09/2018</a:t>
+              <a:t>23/10/2018</a:t>
             </a:fld>
             <a:endParaRPr lang="en-IE"/>
           </a:p>
@@ -4276,7 +4272,7 @@
               <a:pPr>
                 <a:defRPr/>
               </a:pPr>
-              <a:t>26/09/2018</a:t>
+              <a:t>23/10/2018</a:t>
             </a:fld>
             <a:endParaRPr lang="en-IE"/>
           </a:p>
@@ -4609,7 +4605,7 @@
               <a:pPr>
                 <a:defRPr/>
               </a:pPr>
-              <a:t>26/09/2018</a:t>
+              <a:t>23/10/2018</a:t>
             </a:fld>
             <a:endParaRPr lang="en-IE"/>
           </a:p>
@@ -5076,7 +5072,7 @@
               <a:pPr>
                 <a:defRPr/>
               </a:pPr>
-              <a:t>26/09/2018</a:t>
+              <a:t>23/10/2018</a:t>
             </a:fld>
             <a:endParaRPr lang="en-IE"/>
           </a:p>
@@ -5239,7 +5235,7 @@
               <a:pPr>
                 <a:defRPr/>
               </a:pPr>
-              <a:t>26/09/2018</a:t>
+              <a:t>23/10/2018</a:t>
             </a:fld>
             <a:endParaRPr lang="en-IE"/>
           </a:p>
@@ -5379,7 +5375,7 @@
               <a:pPr>
                 <a:defRPr/>
               </a:pPr>
-              <a:t>26/09/2018</a:t>
+              <a:t>23/10/2018</a:t>
             </a:fld>
             <a:endParaRPr lang="en-IE"/>
           </a:p>
@@ -5701,7 +5697,7 @@
               <a:pPr>
                 <a:defRPr/>
               </a:pPr>
-              <a:t>26/09/2018</a:t>
+              <a:t>23/10/2018</a:t>
             </a:fld>
             <a:endParaRPr lang="en-IE"/>
           </a:p>
@@ -6002,7 +5998,7 @@
               <a:pPr>
                 <a:defRPr/>
               </a:pPr>
-              <a:t>26/09/2018</a:t>
+              <a:t>23/10/2018</a:t>
             </a:fld>
             <a:endParaRPr lang="en-IE"/>
           </a:p>
@@ -6330,7 +6326,7 @@
               <a:pPr>
                 <a:defRPr/>
               </a:pPr>
-              <a:t>26/09/2018</a:t>
+              <a:t>23/10/2018</a:t>
             </a:fld>
             <a:endParaRPr lang="en-IE"/>
           </a:p>
@@ -7074,7 +7070,7 @@
               <a:pPr>
                 <a:defRPr/>
               </a:pPr>
-              <a:t>26/09/2018</a:t>
+              <a:t>23/10/2018</a:t>
             </a:fld>
             <a:endParaRPr lang="en-IE"/>
           </a:p>
@@ -38748,7 +38744,7 @@
               <a:defRPr/>
             </a:pPr>
             <a:r>
-              <a:rPr lang="en-IE" altLang="en-US" sz="2400" dirty="0"/>
+              <a:rPr lang="en-IE" altLang="en-US" sz="2400" b="1" u="sng" dirty="0"/>
               <a:t>Agile &amp; Waterfall methodologies used</a:t>
             </a:r>
           </a:p>

</xml_diff>